<commit_message>
Fórmula mapa conceptual MA_08_07_CO
</commit_message>
<xml_diff>
--- a/fuentes/contenidos/grado08/guion07/Mapa_conceptual_MA_08_07_REC.pptx
+++ b/fuentes/contenidos/grado08/guion07/Mapa_conceptual_MA_08_07_REC.pptx
@@ -450,7 +450,7 @@
           <a:p>
             <a:fld id="{5001C876-01F7-4317-94B9-1AE222133113}" type="datetimeFigureOut">
               <a:rPr lang="es-ES" smtClean="0"/>
-              <a:t>06/01/2016</a:t>
+              <a:t>25/01/2016</a:t>
             </a:fld>
             <a:endParaRPr lang="es-ES" dirty="0"/>
           </a:p>
@@ -1328,17 +1328,7 @@
                 <a:latin typeface="Arial" panose="020B0604020202020204" pitchFamily="34" charset="0"/>
                 <a:cs typeface="Arial" panose="020B0604020202020204" pitchFamily="34" charset="0"/>
               </a:rPr>
-              <a:t>ariable </a:t>
-            </a:r>
-            <a:r>
-              <a:rPr lang="es-ES" sz="1050" dirty="0" smtClean="0">
-                <a:solidFill>
-                  <a:schemeClr val="bg1"/>
-                </a:solidFill>
-                <a:latin typeface="Arial" panose="020B0604020202020204" pitchFamily="34" charset="0"/>
-                <a:cs typeface="Arial" panose="020B0604020202020204" pitchFamily="34" charset="0"/>
-              </a:rPr>
-              <a:t>dependiente </a:t>
+              <a:t>ariable dependiente </a:t>
             </a:r>
             <a:r>
               <a:rPr lang="es-ES" sz="1050" i="1" dirty="0" smtClean="0">
@@ -1611,13 +1601,6 @@
               </a:rPr>
               <a:t>ominio</a:t>
             </a:r>
-            <a:endParaRPr lang="es-ES" sz="900" dirty="0" smtClean="0">
-              <a:solidFill>
-                <a:schemeClr val="tx1"/>
-              </a:solidFill>
-              <a:latin typeface="Arial" panose="020B0604020202020204" pitchFamily="34" charset="0"/>
-              <a:cs typeface="Arial" panose="020B0604020202020204" pitchFamily="34" charset="0"/>
-            </a:endParaRPr>
           </a:p>
           <a:p>
             <a:pPr algn="ctr"/>
@@ -1703,17 +1686,7 @@
                 <a:latin typeface="Arial" panose="020B0604020202020204" pitchFamily="34" charset="0"/>
                 <a:cs typeface="Arial" panose="020B0604020202020204" pitchFamily="34" charset="0"/>
               </a:rPr>
-              <a:t>representación</a:t>
-            </a:r>
-            <a:r>
-              <a:rPr lang="es-ES" sz="900" dirty="0" smtClean="0">
-                <a:solidFill>
-                  <a:schemeClr val="tx1"/>
-                </a:solidFill>
-                <a:latin typeface="Arial" panose="020B0604020202020204" pitchFamily="34" charset="0"/>
-                <a:cs typeface="Arial" panose="020B0604020202020204" pitchFamily="34" charset="0"/>
-              </a:rPr>
-              <a:t>:</a:t>
+              <a:t>representación:</a:t>
             </a:r>
           </a:p>
           <a:p>
@@ -2136,17 +2109,7 @@
                 <a:latin typeface="Arial" panose="020B0604020202020204" pitchFamily="34" charset="0"/>
                 <a:cs typeface="Arial" panose="020B0604020202020204" pitchFamily="34" charset="0"/>
               </a:rPr>
-              <a:t>quella </a:t>
-            </a:r>
-            <a:r>
-              <a:rPr lang="es-ES" sz="1050" dirty="0" smtClean="0">
-                <a:solidFill>
-                  <a:schemeClr val="bg1"/>
-                </a:solidFill>
-                <a:latin typeface="Arial" panose="020B0604020202020204" pitchFamily="34" charset="0"/>
-                <a:cs typeface="Arial" panose="020B0604020202020204" pitchFamily="34" charset="0"/>
-              </a:rPr>
-              <a:t>cuya representación gráfica es una recta</a:t>
+              <a:t>quella cuya representación gráfica es una recta</a:t>
             </a:r>
             <a:endParaRPr lang="es-ES" sz="1050" dirty="0">
               <a:solidFill>
@@ -2390,14 +2353,7 @@
                 <a:latin typeface="Arial" panose="020B0604020202020204" pitchFamily="34" charset="0"/>
                 <a:cs typeface="Arial" panose="020B0604020202020204" pitchFamily="34" charset="0"/>
               </a:rPr>
-              <a:t>tipos </a:t>
-            </a:r>
-            <a:r>
-              <a:rPr lang="es-ES" sz="900" dirty="0" smtClean="0">
-                <a:latin typeface="Arial" panose="020B0604020202020204" pitchFamily="34" charset="0"/>
-                <a:cs typeface="Arial" panose="020B0604020202020204" pitchFamily="34" charset="0"/>
-              </a:rPr>
-              <a:t>de funciones </a:t>
+              <a:t>tipos de funciones </a:t>
             </a:r>
             <a:endParaRPr lang="es-ES" sz="900" dirty="0">
               <a:latin typeface="Arial" panose="020B0604020202020204" pitchFamily="34" charset="0"/>
@@ -2578,17 +2534,7 @@
                 <a:latin typeface="Arial" panose="020B0604020202020204" pitchFamily="34" charset="0"/>
                 <a:cs typeface="Arial" panose="020B0604020202020204" pitchFamily="34" charset="0"/>
               </a:rPr>
-              <a:t>orresponde </a:t>
-            </a:r>
-            <a:r>
-              <a:rPr lang="es-ES" sz="1050" dirty="0" smtClean="0">
-                <a:solidFill>
-                  <a:schemeClr val="bg1"/>
-                </a:solidFill>
-                <a:latin typeface="Arial" panose="020B0604020202020204" pitchFamily="34" charset="0"/>
-                <a:cs typeface="Arial" panose="020B0604020202020204" pitchFamily="34" charset="0"/>
-              </a:rPr>
-              <a:t>a un polinomio de segundo grado</a:t>
+              <a:t>orresponde a un polinomio de segundo grado</a:t>
             </a:r>
             <a:endParaRPr lang="es-ES" sz="1050" dirty="0">
               <a:solidFill>
@@ -2724,109 +2670,6 @@
           <a:lstStyle/>
           <a:p>
             <a:pPr algn="ctr"/>
-            <a:r>
-              <a:rPr lang="es-ES" sz="900" i="1" dirty="0" smtClean="0">
-                <a:solidFill>
-                  <a:schemeClr val="tx1"/>
-                </a:solidFill>
-                <a:latin typeface="Arial" panose="020B0604020202020204" pitchFamily="34" charset="0"/>
-                <a:cs typeface="Arial" panose="020B0604020202020204" pitchFamily="34" charset="0"/>
-              </a:rPr>
-              <a:t>f</a:t>
-            </a:r>
-            <a:r>
-              <a:rPr lang="es-ES" sz="900" dirty="0" smtClean="0">
-                <a:solidFill>
-                  <a:schemeClr val="tx1"/>
-                </a:solidFill>
-                <a:latin typeface="Arial" panose="020B0604020202020204" pitchFamily="34" charset="0"/>
-                <a:cs typeface="Arial" panose="020B0604020202020204" pitchFamily="34" charset="0"/>
-              </a:rPr>
-              <a:t>(</a:t>
-            </a:r>
-            <a:r>
-              <a:rPr lang="es-ES" sz="900" i="1" dirty="0" smtClean="0">
-                <a:solidFill>
-                  <a:schemeClr val="tx1"/>
-                </a:solidFill>
-                <a:latin typeface="Arial" panose="020B0604020202020204" pitchFamily="34" charset="0"/>
-                <a:cs typeface="Arial" panose="020B0604020202020204" pitchFamily="34" charset="0"/>
-              </a:rPr>
-              <a:t>x</a:t>
-            </a:r>
-            <a:r>
-              <a:rPr lang="es-ES" sz="900" dirty="0" smtClean="0">
-                <a:solidFill>
-                  <a:schemeClr val="tx1"/>
-                </a:solidFill>
-                <a:latin typeface="Arial" panose="020B0604020202020204" pitchFamily="34" charset="0"/>
-                <a:cs typeface="Arial" panose="020B0604020202020204" pitchFamily="34" charset="0"/>
-              </a:rPr>
-              <a:t>) = </a:t>
-            </a:r>
-            <a:r>
-              <a:rPr lang="es-ES" sz="900" i="1" dirty="0" smtClean="0">
-                <a:solidFill>
-                  <a:schemeClr val="tx1"/>
-                </a:solidFill>
-                <a:latin typeface="Arial" panose="020B0604020202020204" pitchFamily="34" charset="0"/>
-                <a:cs typeface="Arial" panose="020B0604020202020204" pitchFamily="34" charset="0"/>
-              </a:rPr>
-              <a:t>ax² </a:t>
-            </a:r>
-            <a:r>
-              <a:rPr lang="es-ES" sz="900" dirty="0" smtClean="0">
-                <a:solidFill>
-                  <a:schemeClr val="tx1"/>
-                </a:solidFill>
-                <a:latin typeface="Arial" panose="020B0604020202020204" pitchFamily="34" charset="0"/>
-                <a:cs typeface="Arial" panose="020B0604020202020204" pitchFamily="34" charset="0"/>
-              </a:rPr>
-              <a:t>+ </a:t>
-            </a:r>
-            <a:r>
-              <a:rPr lang="es-ES" sz="900" i="1" dirty="0" smtClean="0">
-                <a:solidFill>
-                  <a:schemeClr val="tx1"/>
-                </a:solidFill>
-                <a:latin typeface="Arial" panose="020B0604020202020204" pitchFamily="34" charset="0"/>
-                <a:cs typeface="Arial" panose="020B0604020202020204" pitchFamily="34" charset="0"/>
-              </a:rPr>
-              <a:t>bx + c</a:t>
-            </a:r>
-          </a:p>
-          <a:p>
-            <a:pPr algn="ctr"/>
-            <a:r>
-              <a:rPr lang="es-ES" sz="900" dirty="0" smtClean="0">
-                <a:solidFill>
-                  <a:schemeClr val="tx1"/>
-                </a:solidFill>
-                <a:latin typeface="Arial" panose="020B0604020202020204" pitchFamily="34" charset="0"/>
-                <a:cs typeface="Arial" panose="020B0604020202020204" pitchFamily="34" charset="0"/>
-              </a:rPr>
-              <a:t>donde </a:t>
-            </a:r>
-            <a:r>
-              <a:rPr lang="es-ES" sz="900" i="1" dirty="0" smtClean="0">
-                <a:solidFill>
-                  <a:schemeClr val="tx1"/>
-                </a:solidFill>
-                <a:latin typeface="Arial" panose="020B0604020202020204" pitchFamily="34" charset="0"/>
-                <a:cs typeface="Arial" panose="020B0604020202020204" pitchFamily="34" charset="0"/>
-              </a:rPr>
-              <a:t>a</a:t>
-            </a:r>
-            <a:r>
-              <a:rPr lang="es-ES" sz="900" dirty="0" smtClean="0">
-                <a:solidFill>
-                  <a:schemeClr val="tx1"/>
-                </a:solidFill>
-                <a:latin typeface="Arial" panose="020B0604020202020204" pitchFamily="34" charset="0"/>
-                <a:cs typeface="Arial" panose="020B0604020202020204" pitchFamily="34" charset="0"/>
-              </a:rPr>
-              <a:t> es diferente de cero</a:t>
-            </a:r>
             <a:endParaRPr lang="es-ES" sz="900" dirty="0">
               <a:solidFill>
                 <a:schemeClr val="tx1"/>
@@ -2920,16 +2763,6 @@
           <a:p>
             <a:pPr algn="ctr"/>
             <a:r>
-              <a:rPr lang="es-ES" sz="900" dirty="0">
-                <a:solidFill>
-                  <a:schemeClr val="tx1"/>
-                </a:solidFill>
-                <a:latin typeface="Arial" panose="020B0604020202020204" pitchFamily="34" charset="0"/>
-                <a:cs typeface="Arial" panose="020B0604020202020204" pitchFamily="34" charset="0"/>
-              </a:rPr>
-              <a:t>p</a:t>
-            </a:r>
-            <a:r>
               <a:rPr lang="es-ES" sz="900" dirty="0" smtClean="0">
                 <a:solidFill>
                   <a:schemeClr val="tx1"/>
@@ -2937,161 +2770,21 @@
                 <a:latin typeface="Arial" panose="020B0604020202020204" pitchFamily="34" charset="0"/>
                 <a:cs typeface="Arial" panose="020B0604020202020204" pitchFamily="34" charset="0"/>
               </a:rPr>
-              <a:t>endiente</a:t>
-            </a:r>
-            <a:endParaRPr lang="es-ES" sz="900" dirty="0" smtClean="0">
-              <a:solidFill>
-                <a:schemeClr val="tx1"/>
-              </a:solidFill>
-              <a:latin typeface="Arial" panose="020B0604020202020204" pitchFamily="34" charset="0"/>
-              <a:cs typeface="Arial" panose="020B0604020202020204" pitchFamily="34" charset="0"/>
-            </a:endParaRPr>
+              <a:t>Pendiente de la recta</a:t>
+            </a:r>
           </a:p>
           <a:p>
             <a:pPr algn="ctr"/>
             <a:r>
-              <a:rPr lang="es-ES" sz="900" i="1" dirty="0">
-                <a:solidFill>
-                  <a:schemeClr val="tx1"/>
-                </a:solidFill>
-                <a:latin typeface="Arial" panose="020B0604020202020204" pitchFamily="34" charset="0"/>
-                <a:cs typeface="Arial" panose="020B0604020202020204" pitchFamily="34" charset="0"/>
-              </a:rPr>
-              <a:t>m</a:t>
-            </a:r>
-            <a:r>
-              <a:rPr lang="es-ES" sz="900" dirty="0">
-                <a:solidFill>
-                  <a:schemeClr val="tx1"/>
-                </a:solidFill>
-                <a:latin typeface="Arial" panose="020B0604020202020204" pitchFamily="34" charset="0"/>
-                <a:cs typeface="Arial" panose="020B0604020202020204" pitchFamily="34" charset="0"/>
-              </a:rPr>
-              <a:t> = (</a:t>
-            </a:r>
-            <a:r>
-              <a:rPr lang="es-ES" sz="900" i="1" dirty="0">
-                <a:solidFill>
-                  <a:schemeClr val="tx1"/>
-                </a:solidFill>
-                <a:latin typeface="Arial" panose="020B0604020202020204" pitchFamily="34" charset="0"/>
-                <a:cs typeface="Arial" panose="020B0604020202020204" pitchFamily="34" charset="0"/>
-              </a:rPr>
-              <a:t>y</a:t>
-            </a:r>
-            <a:r>
-              <a:rPr lang="es-ES" sz="500" dirty="0">
-                <a:solidFill>
-                  <a:schemeClr val="tx1"/>
-                </a:solidFill>
-                <a:latin typeface="Arial" panose="020B0604020202020204" pitchFamily="34" charset="0"/>
-                <a:cs typeface="Arial" panose="020B0604020202020204" pitchFamily="34" charset="0"/>
-              </a:rPr>
-              <a:t>2</a:t>
-            </a:r>
-            <a:r>
-              <a:rPr lang="es-ES" sz="900" dirty="0">
-                <a:solidFill>
-                  <a:schemeClr val="tx1"/>
-                </a:solidFill>
-                <a:latin typeface="Arial" panose="020B0604020202020204" pitchFamily="34" charset="0"/>
-                <a:cs typeface="Arial" panose="020B0604020202020204" pitchFamily="34" charset="0"/>
-              </a:rPr>
-              <a:t> – </a:t>
-            </a:r>
-            <a:r>
-              <a:rPr lang="es-ES" sz="900" i="1" dirty="0">
-                <a:solidFill>
-                  <a:schemeClr val="tx1"/>
-                </a:solidFill>
-                <a:latin typeface="Arial" panose="020B0604020202020204" pitchFamily="34" charset="0"/>
-                <a:cs typeface="Arial" panose="020B0604020202020204" pitchFamily="34" charset="0"/>
-              </a:rPr>
-              <a:t>y</a:t>
-            </a:r>
-            <a:r>
-              <a:rPr lang="es-ES" sz="500" dirty="0">
-                <a:solidFill>
-                  <a:schemeClr val="tx1"/>
-                </a:solidFill>
-                <a:latin typeface="Arial" panose="020B0604020202020204" pitchFamily="34" charset="0"/>
-                <a:cs typeface="Arial" panose="020B0604020202020204" pitchFamily="34" charset="0"/>
-              </a:rPr>
-              <a:t>1</a:t>
-            </a:r>
-            <a:r>
-              <a:rPr lang="es-ES" sz="900" dirty="0">
-                <a:solidFill>
-                  <a:schemeClr val="tx1"/>
-                </a:solidFill>
-                <a:latin typeface="Arial" panose="020B0604020202020204" pitchFamily="34" charset="0"/>
-                <a:cs typeface="Arial" panose="020B0604020202020204" pitchFamily="34" charset="0"/>
-              </a:rPr>
-              <a:t>)/(</a:t>
-            </a:r>
-            <a:r>
-              <a:rPr lang="es-ES" sz="900" i="1" dirty="0">
-                <a:solidFill>
-                  <a:schemeClr val="tx1"/>
-                </a:solidFill>
-                <a:latin typeface="Arial" panose="020B0604020202020204" pitchFamily="34" charset="0"/>
-                <a:cs typeface="Arial" panose="020B0604020202020204" pitchFamily="34" charset="0"/>
-              </a:rPr>
-              <a:t>x</a:t>
-            </a:r>
-            <a:r>
-              <a:rPr lang="es-ES" sz="500" dirty="0">
-                <a:solidFill>
-                  <a:schemeClr val="tx1"/>
-                </a:solidFill>
-                <a:latin typeface="Arial" panose="020B0604020202020204" pitchFamily="34" charset="0"/>
-                <a:cs typeface="Arial" panose="020B0604020202020204" pitchFamily="34" charset="0"/>
-              </a:rPr>
-              <a:t>2</a:t>
-            </a:r>
-            <a:r>
-              <a:rPr lang="es-ES" sz="900" dirty="0">
-                <a:solidFill>
-                  <a:schemeClr val="tx1"/>
-                </a:solidFill>
-                <a:latin typeface="Arial" panose="020B0604020202020204" pitchFamily="34" charset="0"/>
-                <a:cs typeface="Arial" panose="020B0604020202020204" pitchFamily="34" charset="0"/>
-              </a:rPr>
-              <a:t> </a:t>
-            </a:r>
-            <a:r>
-              <a:rPr lang="es-ES" sz="900" i="1" dirty="0">
-                <a:solidFill>
-                  <a:schemeClr val="tx1"/>
-                </a:solidFill>
-                <a:latin typeface="Arial" panose="020B0604020202020204" pitchFamily="34" charset="0"/>
-                <a:cs typeface="Arial" panose="020B0604020202020204" pitchFamily="34" charset="0"/>
-              </a:rPr>
-              <a:t>– x</a:t>
-            </a:r>
-            <a:r>
-              <a:rPr lang="es-ES" sz="500" dirty="0">
-                <a:solidFill>
-                  <a:schemeClr val="tx1"/>
-                </a:solidFill>
-                <a:latin typeface="Arial" panose="020B0604020202020204" pitchFamily="34" charset="0"/>
-                <a:cs typeface="Arial" panose="020B0604020202020204" pitchFamily="34" charset="0"/>
-              </a:rPr>
-              <a:t>1</a:t>
-            </a:r>
-            <a:r>
-              <a:rPr lang="es-ES" sz="900" dirty="0">
-                <a:solidFill>
-                  <a:schemeClr val="tx1"/>
-                </a:solidFill>
-                <a:latin typeface="Arial" panose="020B0604020202020204" pitchFamily="34" charset="0"/>
-                <a:cs typeface="Arial" panose="020B0604020202020204" pitchFamily="34" charset="0"/>
-              </a:rPr>
-              <a:t>)</a:t>
-            </a:r>
-          </a:p>
-          <a:p>
-            <a:pPr algn="ctr"/>
+              <a:rPr lang="es-ES" sz="900" i="1" dirty="0" smtClean="0">
+                <a:solidFill>
+                  <a:schemeClr val="tx1"/>
+                </a:solidFill>
+                <a:latin typeface="Arial" panose="020B0604020202020204" pitchFamily="34" charset="0"/>
+                <a:cs typeface="Arial" panose="020B0604020202020204" pitchFamily="34" charset="0"/>
+              </a:rPr>
+              <a:t>m = y/x</a:t>
+            </a:r>
             <a:endParaRPr lang="es-ES" sz="900" dirty="0">
               <a:solidFill>
                 <a:schemeClr val="tx1"/>
@@ -3281,17 +2974,7 @@
                 <a:latin typeface="Arial" panose="020B0604020202020204" pitchFamily="34" charset="0"/>
                 <a:cs typeface="Arial" panose="020B0604020202020204" pitchFamily="34" charset="0"/>
               </a:rPr>
-              <a:t>rientación </a:t>
-            </a:r>
-            <a:r>
-              <a:rPr lang="es-ES" sz="900" dirty="0" smtClean="0">
-                <a:solidFill>
-                  <a:schemeClr val="tx1"/>
-                </a:solidFill>
-                <a:latin typeface="Arial" panose="020B0604020202020204" pitchFamily="34" charset="0"/>
-                <a:cs typeface="Arial" panose="020B0604020202020204" pitchFamily="34" charset="0"/>
-              </a:rPr>
-              <a:t>de la recta</a:t>
+              <a:t>rientación de la recta</a:t>
             </a:r>
             <a:endParaRPr lang="es-ES" sz="900" dirty="0">
               <a:solidFill>
@@ -3365,13 +3048,6 @@
               </a:rPr>
               <a:t>reciente</a:t>
             </a:r>
-            <a:endParaRPr lang="es-ES" sz="900" dirty="0" smtClean="0">
-              <a:solidFill>
-                <a:schemeClr val="tx1"/>
-              </a:solidFill>
-              <a:latin typeface="Arial" panose="020B0604020202020204" pitchFamily="34" charset="0"/>
-              <a:cs typeface="Arial" panose="020B0604020202020204" pitchFamily="34" charset="0"/>
-            </a:endParaRPr>
           </a:p>
           <a:p>
             <a:pPr algn="ctr"/>
@@ -3711,13 +3387,6 @@
               </a:rPr>
               <a:t>ecreciente</a:t>
             </a:r>
-            <a:endParaRPr lang="es-ES" sz="900" dirty="0" smtClean="0">
-              <a:solidFill>
-                <a:schemeClr val="tx1"/>
-              </a:solidFill>
-              <a:latin typeface="Arial" panose="020B0604020202020204" pitchFamily="34" charset="0"/>
-              <a:cs typeface="Arial" panose="020B0604020202020204" pitchFamily="34" charset="0"/>
-            </a:endParaRPr>
           </a:p>
           <a:p>
             <a:pPr algn="ctr"/>
@@ -3873,13 +3542,6 @@
               </a:rPr>
               <a:t>orizontal</a:t>
             </a:r>
-            <a:endParaRPr lang="es-ES" sz="900" dirty="0" smtClean="0">
-              <a:solidFill>
-                <a:schemeClr val="tx1"/>
-              </a:solidFill>
-              <a:latin typeface="Arial" panose="020B0604020202020204" pitchFamily="34" charset="0"/>
-              <a:cs typeface="Arial" panose="020B0604020202020204" pitchFamily="34" charset="0"/>
-            </a:endParaRPr>
           </a:p>
           <a:p>
             <a:pPr algn="ctr"/>
@@ -4295,17 +3957,7 @@
                 <a:latin typeface="Arial" panose="020B0604020202020204" pitchFamily="34" charset="0"/>
                 <a:cs typeface="Arial" panose="020B0604020202020204" pitchFamily="34" charset="0"/>
               </a:rPr>
-              <a:t>értice</a:t>
-            </a:r>
-            <a:r>
-              <a:rPr lang="es-ES" sz="900" dirty="0" smtClean="0">
-                <a:solidFill>
-                  <a:schemeClr val="tx1"/>
-                </a:solidFill>
-                <a:latin typeface="Arial" panose="020B0604020202020204" pitchFamily="34" charset="0"/>
-                <a:cs typeface="Arial" panose="020B0604020202020204" pitchFamily="34" charset="0"/>
-              </a:rPr>
-              <a:t>:</a:t>
+              <a:t>értice:</a:t>
             </a:r>
           </a:p>
           <a:p>
@@ -4490,17 +4142,7 @@
                 <a:latin typeface="Arial" panose="020B0604020202020204" pitchFamily="34" charset="0"/>
                 <a:cs typeface="Arial" panose="020B0604020202020204" pitchFamily="34" charset="0"/>
               </a:rPr>
-              <a:t>aíces</a:t>
-            </a:r>
-            <a:r>
-              <a:rPr lang="es-ES" sz="900" dirty="0" smtClean="0">
-                <a:solidFill>
-                  <a:schemeClr val="tx1"/>
-                </a:solidFill>
-                <a:latin typeface="Arial" panose="020B0604020202020204" pitchFamily="34" charset="0"/>
-                <a:cs typeface="Arial" panose="020B0604020202020204" pitchFamily="34" charset="0"/>
-              </a:rPr>
-              <a:t>:</a:t>
+              <a:t>aíces:</a:t>
             </a:r>
           </a:p>
           <a:p>
@@ -4632,17 +4274,7 @@
                 <a:latin typeface="Arial" panose="020B0604020202020204" pitchFamily="34" charset="0"/>
                 <a:cs typeface="Arial" panose="020B0604020202020204" pitchFamily="34" charset="0"/>
               </a:rPr>
-              <a:t>eje </a:t>
-            </a:r>
-            <a:r>
-              <a:rPr lang="es-ES" sz="900" dirty="0" smtClean="0">
-                <a:solidFill>
-                  <a:schemeClr val="tx1"/>
-                </a:solidFill>
-                <a:latin typeface="Arial" panose="020B0604020202020204" pitchFamily="34" charset="0"/>
-                <a:cs typeface="Arial" panose="020B0604020202020204" pitchFamily="34" charset="0"/>
-              </a:rPr>
-              <a:t>de simetría:</a:t>
+              <a:t>eje de simetría:</a:t>
             </a:r>
           </a:p>
           <a:p>
@@ -4727,17 +4359,7 @@
                 <a:latin typeface="Arial" panose="020B0604020202020204" pitchFamily="34" charset="0"/>
                 <a:cs typeface="Arial" panose="020B0604020202020204" pitchFamily="34" charset="0"/>
               </a:rPr>
-              <a:t>oncavidad</a:t>
-            </a:r>
-            <a:r>
-              <a:rPr lang="es-ES" sz="900" dirty="0" smtClean="0">
-                <a:solidFill>
-                  <a:schemeClr val="tx1"/>
-                </a:solidFill>
-                <a:latin typeface="Arial" panose="020B0604020202020204" pitchFamily="34" charset="0"/>
-                <a:cs typeface="Arial" panose="020B0604020202020204" pitchFamily="34" charset="0"/>
-              </a:rPr>
-              <a:t>:</a:t>
+              <a:t>oncavidad:</a:t>
             </a:r>
           </a:p>
           <a:p>
@@ -4822,17 +4444,7 @@
                 <a:latin typeface="Arial" panose="020B0604020202020204" pitchFamily="34" charset="0"/>
                 <a:cs typeface="Arial" panose="020B0604020202020204" pitchFamily="34" charset="0"/>
               </a:rPr>
-              <a:t>acia </a:t>
-            </a:r>
-            <a:r>
-              <a:rPr lang="es-ES" sz="900" dirty="0" smtClean="0">
-                <a:solidFill>
-                  <a:schemeClr val="tx1"/>
-                </a:solidFill>
-                <a:latin typeface="Arial" panose="020B0604020202020204" pitchFamily="34" charset="0"/>
-                <a:cs typeface="Arial" panose="020B0604020202020204" pitchFamily="34" charset="0"/>
-              </a:rPr>
-              <a:t>arriba</a:t>
+              <a:t>acia arriba</a:t>
             </a:r>
           </a:p>
           <a:p>
@@ -4987,17 +4599,7 @@
                 <a:latin typeface="Arial" panose="020B0604020202020204" pitchFamily="34" charset="0"/>
                 <a:cs typeface="Arial" panose="020B0604020202020204" pitchFamily="34" charset="0"/>
               </a:rPr>
-              <a:t>acia </a:t>
-            </a:r>
-            <a:r>
-              <a:rPr lang="es-ES" sz="900" dirty="0" smtClean="0">
-                <a:solidFill>
-                  <a:schemeClr val="tx1"/>
-                </a:solidFill>
-                <a:latin typeface="Arial" panose="020B0604020202020204" pitchFamily="34" charset="0"/>
-                <a:cs typeface="Arial" panose="020B0604020202020204" pitchFamily="34" charset="0"/>
-              </a:rPr>
-              <a:t>abajo</a:t>
+              <a:t>acia abajo</a:t>
             </a:r>
           </a:p>
           <a:p>
@@ -5212,6 +4814,36 @@
           </a:fontRef>
         </p:style>
       </p:cxnSp>
+      <p:pic>
+        <p:nvPicPr>
+          <p:cNvPr id="3" name="Imagen 2"/>
+          <p:cNvPicPr>
+            <a:picLocks noChangeAspect="1"/>
+          </p:cNvPicPr>
+          <p:nvPr/>
+        </p:nvPicPr>
+        <p:blipFill>
+          <a:blip r:embed="rId2" cstate="print">
+            <a:extLst>
+              <a:ext uri="{28A0092B-C50C-407E-A947-70E740481C1C}">
+                <a14:useLocalDpi xmlns:a14="http://schemas.microsoft.com/office/drawing/2010/main" val="0"/>
+              </a:ext>
+            </a:extLst>
+          </a:blip>
+          <a:stretch>
+            <a:fillRect/>
+          </a:stretch>
+        </p:blipFill>
+        <p:spPr>
+          <a:xfrm>
+            <a:off x="5004205" y="3654488"/>
+            <a:ext cx="1478974" cy="178355"/>
+          </a:xfrm>
+          <a:prstGeom prst="rect">
+            <a:avLst/>
+          </a:prstGeom>
+        </p:spPr>
+      </p:pic>
     </p:spTree>
     <p:extLst>
       <p:ext uri="{BB962C8B-B14F-4D97-AF65-F5344CB8AC3E}">

</xml_diff>